<commit_message>
poster updates (pptx + pdf)
</commit_message>
<xml_diff>
--- a/images/poster?/Goallective.pptx
+++ b/images/poster?/Goallective.pptx
@@ -4385,6 +4385,45 @@
           </a:p>
         </p:txBody>
       </p:sp>
+      <p:pic>
+        <p:nvPicPr>
+          <p:cNvPr id="6" name="Picture 5" descr="screenshot1.png"/>
+          <p:cNvPicPr>
+            <a:picLocks noChangeAspect="1"/>
+          </p:cNvPicPr>
+          <p:nvPr/>
+        </p:nvPicPr>
+        <p:blipFill rotWithShape="1">
+          <a:blip r:embed="rId9">
+            <a:extLst>
+              <a:ext uri="{28A0092B-C50C-407E-A947-70E740481C1C}">
+                <a14:useLocalDpi xmlns:a14="http://schemas.microsoft.com/office/drawing/2010/main" val="0"/>
+              </a:ext>
+            </a:extLst>
+          </a:blip>
+          <a:srcRect b="6441"/>
+          <a:stretch/>
+        </p:blipFill>
+        <p:spPr>
+          <a:xfrm>
+            <a:off x="24774991" y="32913412"/>
+            <a:ext cx="4099676" cy="7264992"/>
+          </a:xfrm>
+          <a:prstGeom prst="rect">
+            <a:avLst/>
+          </a:prstGeom>
+          <a:ln>
+            <a:noFill/>
+          </a:ln>
+          <a:effectLst>
+            <a:outerShdw blurRad="469900" dist="50800" dir="2700000" sx="102000" sy="102000" algn="tl" rotWithShape="0">
+              <a:srgbClr val="000000">
+                <a:alpha val="20000"/>
+              </a:srgbClr>
+            </a:outerShdw>
+          </a:effectLst>
+        </p:spPr>
+      </p:pic>
     </p:spTree>
     <p:extLst>
       <p:ext uri="{BB962C8B-B14F-4D97-AF65-F5344CB8AC3E}">

</xml_diff>